<commit_message>
update to workshop 1
</commit_message>
<xml_diff>
--- a/workshop1/BM211 workshop 1 2024.pptx
+++ b/workshop1/BM211 workshop 1 2024.pptx
@@ -5,7 +5,7 @@
     <p:sldMasterId id="2147483648" r:id="rId1"/>
   </p:sldMasterIdLst>
   <p:notesMasterIdLst>
-    <p:notesMasterId r:id="rId15"/>
+    <p:notesMasterId r:id="rId17"/>
   </p:notesMasterIdLst>
   <p:sldIdLst>
     <p:sldId id="257" r:id="rId2"/>
@@ -13,14 +13,16 @@
     <p:sldId id="279" r:id="rId4"/>
     <p:sldId id="258" r:id="rId5"/>
     <p:sldId id="273" r:id="rId6"/>
-    <p:sldId id="274" r:id="rId7"/>
-    <p:sldId id="270" r:id="rId8"/>
-    <p:sldId id="271" r:id="rId9"/>
-    <p:sldId id="272" r:id="rId10"/>
-    <p:sldId id="275" r:id="rId11"/>
-    <p:sldId id="276" r:id="rId12"/>
-    <p:sldId id="277" r:id="rId13"/>
-    <p:sldId id="278" r:id="rId14"/>
+    <p:sldId id="281" r:id="rId7"/>
+    <p:sldId id="274" r:id="rId8"/>
+    <p:sldId id="280" r:id="rId9"/>
+    <p:sldId id="270" r:id="rId10"/>
+    <p:sldId id="271" r:id="rId11"/>
+    <p:sldId id="272" r:id="rId12"/>
+    <p:sldId id="275" r:id="rId13"/>
+    <p:sldId id="276" r:id="rId14"/>
+    <p:sldId id="277" r:id="rId15"/>
+    <p:sldId id="278" r:id="rId16"/>
   </p:sldIdLst>
   <p:sldSz cx="12192000" cy="6858000"/>
   <p:notesSz cx="6858000" cy="9144000"/>
@@ -209,7 +211,7 @@
           <a:p>
             <a:fld id="{0A89B683-20EE-41A9-9DC8-CD711ED8CE58}" type="datetimeFigureOut">
               <a:rPr lang="en-GB" smtClean="0"/>
-              <a:t>23/06/2023</a:t>
+              <a:t>29/06/2023</a:t>
             </a:fld>
             <a:endParaRPr lang="en-GB"/>
           </a:p>
@@ -608,7 +610,7 @@
           <a:p>
             <a:fld id="{74F0BCF9-F47F-454C-892D-DE19C3C439F5}" type="datetimeFigureOut">
               <a:rPr lang="en-GB" smtClean="0"/>
-              <a:t>23/06/2023</a:t>
+              <a:t>29/06/2023</a:t>
             </a:fld>
             <a:endParaRPr lang="en-GB"/>
           </a:p>
@@ -778,7 +780,7 @@
           <a:p>
             <a:fld id="{74F0BCF9-F47F-454C-892D-DE19C3C439F5}" type="datetimeFigureOut">
               <a:rPr lang="en-GB" smtClean="0"/>
-              <a:t>23/06/2023</a:t>
+              <a:t>29/06/2023</a:t>
             </a:fld>
             <a:endParaRPr lang="en-GB"/>
           </a:p>
@@ -958,7 +960,7 @@
           <a:p>
             <a:fld id="{74F0BCF9-F47F-454C-892D-DE19C3C439F5}" type="datetimeFigureOut">
               <a:rPr lang="en-GB" smtClean="0"/>
-              <a:t>23/06/2023</a:t>
+              <a:t>29/06/2023</a:t>
             </a:fld>
             <a:endParaRPr lang="en-GB"/>
           </a:p>
@@ -1174,7 +1176,7 @@
             <a:fld id="{74F0BCF9-F47F-454C-892D-DE19C3C439F5}" type="datetimeFigureOut">
               <a:rPr lang="en-GB" smtClean="0"/>
               <a:pPr/>
-              <a:t>23/06/2023</a:t>
+              <a:t>29/06/2023</a:t>
             </a:fld>
             <a:endParaRPr lang="en-GB"/>
           </a:p>
@@ -1435,7 +1437,7 @@
           <a:p>
             <a:fld id="{74F0BCF9-F47F-454C-892D-DE19C3C439F5}" type="datetimeFigureOut">
               <a:rPr lang="en-GB" smtClean="0"/>
-              <a:t>23/06/2023</a:t>
+              <a:t>29/06/2023</a:t>
             </a:fld>
             <a:endParaRPr lang="en-GB"/>
           </a:p>
@@ -1667,7 +1669,7 @@
           <a:p>
             <a:fld id="{74F0BCF9-F47F-454C-892D-DE19C3C439F5}" type="datetimeFigureOut">
               <a:rPr lang="en-GB" smtClean="0"/>
-              <a:t>23/06/2023</a:t>
+              <a:t>29/06/2023</a:t>
             </a:fld>
             <a:endParaRPr lang="en-GB"/>
           </a:p>
@@ -2034,7 +2036,7 @@
           <a:p>
             <a:fld id="{74F0BCF9-F47F-454C-892D-DE19C3C439F5}" type="datetimeFigureOut">
               <a:rPr lang="en-GB" smtClean="0"/>
-              <a:t>23/06/2023</a:t>
+              <a:t>29/06/2023</a:t>
             </a:fld>
             <a:endParaRPr lang="en-GB"/>
           </a:p>
@@ -2152,7 +2154,7 @@
           <a:p>
             <a:fld id="{74F0BCF9-F47F-454C-892D-DE19C3C439F5}" type="datetimeFigureOut">
               <a:rPr lang="en-GB" smtClean="0"/>
-              <a:t>23/06/2023</a:t>
+              <a:t>29/06/2023</a:t>
             </a:fld>
             <a:endParaRPr lang="en-GB"/>
           </a:p>
@@ -2247,7 +2249,7 @@
           <a:p>
             <a:fld id="{74F0BCF9-F47F-454C-892D-DE19C3C439F5}" type="datetimeFigureOut">
               <a:rPr lang="en-GB" smtClean="0"/>
-              <a:t>23/06/2023</a:t>
+              <a:t>29/06/2023</a:t>
             </a:fld>
             <a:endParaRPr lang="en-GB"/>
           </a:p>
@@ -2524,7 +2526,7 @@
           <a:p>
             <a:fld id="{74F0BCF9-F47F-454C-892D-DE19C3C439F5}" type="datetimeFigureOut">
               <a:rPr lang="en-GB" smtClean="0"/>
-              <a:t>23/06/2023</a:t>
+              <a:t>29/06/2023</a:t>
             </a:fld>
             <a:endParaRPr lang="en-GB"/>
           </a:p>
@@ -2777,7 +2779,7 @@
           <a:p>
             <a:fld id="{74F0BCF9-F47F-454C-892D-DE19C3C439F5}" type="datetimeFigureOut">
               <a:rPr lang="en-GB" smtClean="0"/>
-              <a:t>23/06/2023</a:t>
+              <a:t>29/06/2023</a:t>
             </a:fld>
             <a:endParaRPr lang="en-GB"/>
           </a:p>
@@ -2990,7 +2992,7 @@
           <a:p>
             <a:fld id="{74F0BCF9-F47F-454C-892D-DE19C3C439F5}" type="datetimeFigureOut">
               <a:rPr lang="en-GB" smtClean="0"/>
-              <a:t>23/06/2023</a:t>
+              <a:t>29/06/2023</a:t>
             </a:fld>
             <a:endParaRPr lang="en-GB"/>
           </a:p>
@@ -3424,27 +3426,48 @@
           <a:lstStyle/>
           <a:p>
             <a:r>
-              <a:rPr lang="en-GB" dirty="0"/>
+              <a:rPr lang="en-GB" dirty="0">
+                <a:latin typeface="Arial" panose="020B0604020202020204" pitchFamily="34" charset="0"/>
+                <a:cs typeface="Arial" panose="020B0604020202020204" pitchFamily="34" charset="0"/>
+              </a:rPr>
               <a:t>BM211 Introduction to Microbiology</a:t>
             </a:r>
             <a:br>
-              <a:rPr lang="en-GB" dirty="0"/>
+              <a:rPr lang="en-GB" dirty="0">
+                <a:latin typeface="Arial" panose="020B0604020202020204" pitchFamily="34" charset="0"/>
+                <a:cs typeface="Arial" panose="020B0604020202020204" pitchFamily="34" charset="0"/>
+              </a:rPr>
             </a:br>
             <a:r>
-              <a:rPr lang="en-GB" dirty="0"/>
+              <a:rPr lang="en-GB" dirty="0">
+                <a:latin typeface="Arial" panose="020B0604020202020204" pitchFamily="34" charset="0"/>
+                <a:cs typeface="Arial" panose="020B0604020202020204" pitchFamily="34" charset="0"/>
+              </a:rPr>
               <a:t>Workshop 1 –</a:t>
             </a:r>
             <a:br>
-              <a:rPr lang="en-GB" dirty="0"/>
+              <a:rPr lang="en-GB" dirty="0">
+                <a:latin typeface="Arial" panose="020B0604020202020204" pitchFamily="34" charset="0"/>
+                <a:cs typeface="Arial" panose="020B0604020202020204" pitchFamily="34" charset="0"/>
+              </a:rPr>
             </a:br>
             <a:r>
-              <a:rPr lang="en-GB" dirty="0"/>
+              <a:rPr lang="en-GB" dirty="0">
+                <a:latin typeface="Arial" panose="020B0604020202020204" pitchFamily="34" charset="0"/>
+                <a:cs typeface="Arial" panose="020B0604020202020204" pitchFamily="34" charset="0"/>
+              </a:rPr>
               <a:t>Microbial Ecology</a:t>
             </a:r>
             <a:br>
-              <a:rPr lang="en-GB" dirty="0"/>
+              <a:rPr lang="en-GB" dirty="0">
+                <a:latin typeface="Arial" panose="020B0604020202020204" pitchFamily="34" charset="0"/>
+                <a:cs typeface="Arial" panose="020B0604020202020204" pitchFamily="34" charset="0"/>
+              </a:rPr>
             </a:br>
-            <a:endParaRPr lang="en-GB" dirty="0"/>
+            <a:endParaRPr lang="en-GB" dirty="0">
+              <a:latin typeface="Arial" panose="020B0604020202020204" pitchFamily="34" charset="0"/>
+              <a:cs typeface="Arial" panose="020B0604020202020204" pitchFamily="34" charset="0"/>
+            </a:endParaRPr>
           </a:p>
         </p:txBody>
       </p:sp>
@@ -3456,8 +3479,8 @@
         </p:nvSpPr>
         <p:spPr>
           <a:xfrm>
-            <a:off x="7129964" y="2967335"/>
-            <a:ext cx="3107451" cy="923330"/>
+            <a:off x="6375126" y="2819863"/>
+            <a:ext cx="3395575" cy="923330"/>
           </a:xfrm>
           <a:prstGeom prst="rect">
             <a:avLst/>
@@ -3471,28 +3494,45 @@
           <a:lstStyle/>
           <a:p>
             <a:r>
-              <a:rPr lang="en-GB" dirty="0" err="1"/>
+              <a:rPr lang="en-GB" dirty="0" err="1">
+                <a:latin typeface="Arial" panose="020B0604020202020204" pitchFamily="34" charset="0"/>
+                <a:cs typeface="Arial" panose="020B0604020202020204" pitchFamily="34" charset="0"/>
+              </a:rPr>
               <a:t>Dr.</a:t>
             </a:r>
             <a:r>
-              <a:rPr lang="en-GB" dirty="0"/>
+              <a:rPr lang="en-GB" dirty="0">
+                <a:latin typeface="Arial" panose="020B0604020202020204" pitchFamily="34" charset="0"/>
+                <a:cs typeface="Arial" panose="020B0604020202020204" pitchFamily="34" charset="0"/>
+              </a:rPr>
               <a:t> Morgan Feeney </a:t>
             </a:r>
             <a:r>
               <a:rPr lang="en-GB" dirty="0">
+                <a:latin typeface="Arial" panose="020B0604020202020204" pitchFamily="34" charset="0"/>
+                <a:cs typeface="Arial" panose="020B0604020202020204" pitchFamily="34" charset="0"/>
                 <a:hlinkClick r:id="rId2"/>
               </a:rPr>
               <a:t>morgan.feeney@strath.ac.uk</a:t>
             </a:r>
             <a:r>
-              <a:rPr lang="en-GB" dirty="0"/>
+              <a:rPr lang="en-GB" dirty="0">
+                <a:latin typeface="Arial" panose="020B0604020202020204" pitchFamily="34" charset="0"/>
+                <a:cs typeface="Arial" panose="020B0604020202020204" pitchFamily="34" charset="0"/>
+              </a:rPr>
               <a:t> @</a:t>
             </a:r>
             <a:r>
-              <a:rPr lang="en-GB" dirty="0" err="1"/>
+              <a:rPr lang="en-GB" dirty="0" err="1">
+                <a:latin typeface="Arial" panose="020B0604020202020204" pitchFamily="34" charset="0"/>
+                <a:cs typeface="Arial" panose="020B0604020202020204" pitchFamily="34" charset="0"/>
+              </a:rPr>
               <a:t>mostlymicrobia</a:t>
             </a:r>
-            <a:endParaRPr lang="en-GB" dirty="0"/>
+            <a:endParaRPr lang="en-GB" dirty="0">
+              <a:latin typeface="Arial" panose="020B0604020202020204" pitchFamily="34" charset="0"/>
+              <a:cs typeface="Arial" panose="020B0604020202020204" pitchFamily="34" charset="0"/>
+            </a:endParaRPr>
           </a:p>
         </p:txBody>
       </p:sp>
@@ -3926,7 +3966,7 @@
         </p:nvSpPr>
         <p:spPr>
           <a:xfrm>
-            <a:off x="1954585" y="2844754"/>
+            <a:off x="2261124" y="2838699"/>
             <a:ext cx="3692415" cy="923330"/>
           </a:xfrm>
           <a:prstGeom prst="rect">
@@ -3941,26 +3981,40 @@
           <a:lstStyle/>
           <a:p>
             <a:r>
-              <a:rPr lang="en-GB" dirty="0" err="1"/>
+              <a:rPr lang="en-GB" dirty="0" err="1">
+                <a:latin typeface="Arial" panose="020B0604020202020204" pitchFamily="34" charset="0"/>
+                <a:cs typeface="Arial" panose="020B0604020202020204" pitchFamily="34" charset="0"/>
+              </a:rPr>
               <a:t>Dr.</a:t>
             </a:r>
             <a:r>
-              <a:rPr lang="en-GB" dirty="0"/>
+              <a:rPr lang="en-GB" dirty="0">
+                <a:latin typeface="Arial" panose="020B0604020202020204" pitchFamily="34" charset="0"/>
+                <a:cs typeface="Arial" panose="020B0604020202020204" pitchFamily="34" charset="0"/>
+              </a:rPr>
               <a:t> Leighton Pritchard</a:t>
             </a:r>
           </a:p>
           <a:p>
             <a:r>
               <a:rPr lang="en-GB" dirty="0">
+                <a:latin typeface="Arial" panose="020B0604020202020204" pitchFamily="34" charset="0"/>
+                <a:cs typeface="Arial" panose="020B0604020202020204" pitchFamily="34" charset="0"/>
                 <a:hlinkClick r:id="rId13"/>
               </a:rPr>
               <a:t>leighton.pritchard@strath.ac.uk</a:t>
             </a:r>
-            <a:endParaRPr lang="en-GB" dirty="0"/>
-          </a:p>
-          <a:p>
-            <a:r>
-              <a:rPr lang="en-GB" dirty="0"/>
+            <a:endParaRPr lang="en-GB" dirty="0">
+              <a:latin typeface="Arial" panose="020B0604020202020204" pitchFamily="34" charset="0"/>
+              <a:cs typeface="Arial" panose="020B0604020202020204" pitchFamily="34" charset="0"/>
+            </a:endParaRPr>
+          </a:p>
+          <a:p>
+            <a:r>
+              <a:rPr lang="en-GB" dirty="0">
+                <a:latin typeface="Arial" panose="020B0604020202020204" pitchFamily="34" charset="0"/>
+                <a:cs typeface="Arial" panose="020B0604020202020204" pitchFamily="34" charset="0"/>
+              </a:rPr>
               <a:t>@widdowquinn</a:t>
             </a:r>
           </a:p>
@@ -4023,15 +4077,8 @@
             </a:r>
             <a:r>
               <a:rPr lang="en-GB" dirty="0"/>
-              <a:t> column data </a:t>
-            </a:r>
-            <a:r>
-              <a:rPr lang="en-GB" dirty="0">
-                <a:sym typeface="Wingdings" panose="05000000000000000000" pitchFamily="2" charset="2"/>
-              </a:rPr>
-              <a:t> R Studio demo</a:t>
-            </a:r>
-            <a:endParaRPr lang="en-GB" dirty="0"/>
+              <a:t> column experimental design details</a:t>
+            </a:r>
           </a:p>
         </p:txBody>
       </p:sp>
@@ -4056,50 +4103,14 @@
           <a:bodyPr/>
           <a:lstStyle/>
           <a:p>
-            <a:r>
-              <a:rPr lang="en-GB" dirty="0"/>
-              <a:t>Which of the plots is "best"/most effective/most useful? </a:t>
-            </a:r>
-          </a:p>
-          <a:p>
-            <a:r>
-              <a:rPr lang="en-GB" dirty="0"/>
-              <a:t>How would you interpret these data? Which column do you think has the most cyanobacteria? </a:t>
-            </a:r>
-          </a:p>
-          <a:p>
-            <a:pPr lvl="1"/>
-            <a:r>
-              <a:rPr lang="en-GB" dirty="0"/>
-              <a:t>Are there any flaws in the experimental design? </a:t>
-            </a:r>
-          </a:p>
-          <a:p>
-            <a:r>
-              <a:rPr lang="en-GB" dirty="0"/>
-              <a:t>Can you think of other ways to visualise and/or present these data? </a:t>
-            </a:r>
-          </a:p>
-          <a:p>
-            <a:pPr lvl="1"/>
-            <a:r>
-              <a:rPr lang="en-GB" dirty="0"/>
-              <a:t>Does the audience you are presenting the data to matter?</a:t>
-            </a:r>
-          </a:p>
-          <a:p>
-            <a:pPr lvl="1"/>
-            <a:r>
-              <a:rPr lang="en-GB" dirty="0"/>
-              <a:t>How would you present these data for publication in a scientific journal?</a:t>
-            </a:r>
+            <a:endParaRPr lang="en-GB"/>
           </a:p>
         </p:txBody>
       </p:sp>
     </p:spTree>
     <p:extLst>
       <p:ext uri="{BB962C8B-B14F-4D97-AF65-F5344CB8AC3E}">
-        <p14:creationId xmlns:p14="http://schemas.microsoft.com/office/powerpoint/2010/main" val="2957678122"/>
+        <p14:creationId xmlns:p14="http://schemas.microsoft.com/office/powerpoint/2010/main" val="782600913"/>
       </p:ext>
     </p:extLst>
   </p:cSld>
@@ -4131,7 +4142,7 @@
           <p:cNvPr id="2" name="Title 1">
             <a:extLst>
               <a:ext uri="{FF2B5EF4-FFF2-40B4-BE49-F238E27FC236}">
-                <a16:creationId xmlns:a16="http://schemas.microsoft.com/office/drawing/2014/main" id="{64D2A8D5-8A52-2C79-B36E-36655F6F18EB}"/>
+                <a16:creationId xmlns:a16="http://schemas.microsoft.com/office/drawing/2014/main" id="{DB90EDC9-44EF-BE03-BA59-2DF481CEA602}"/>
               </a:ext>
             </a:extLst>
           </p:cNvPr>
@@ -4148,9 +4159,20 @@
           <a:lstStyle/>
           <a:p>
             <a:r>
+              <a:rPr lang="en-GB" dirty="0" err="1"/>
+              <a:t>Winogradsky</a:t>
+            </a:r>
+            <a:r>
               <a:rPr lang="en-GB" dirty="0"/>
-              <a:t>Case study 2: </a:t>
-            </a:r>
+              <a:t> column data </a:t>
+            </a:r>
+            <a:r>
+              <a:rPr lang="en-GB" dirty="0">
+                <a:sym typeface="Wingdings" panose="05000000000000000000" pitchFamily="2" charset="2"/>
+              </a:rPr>
+              <a:t> R Studio demo</a:t>
+            </a:r>
+            <a:endParaRPr lang="en-GB" dirty="0"/>
           </a:p>
         </p:txBody>
       </p:sp>
@@ -4159,7 +4181,7 @@
           <p:cNvPr id="3" name="Content Placeholder 2">
             <a:extLst>
               <a:ext uri="{FF2B5EF4-FFF2-40B4-BE49-F238E27FC236}">
-                <a16:creationId xmlns:a16="http://schemas.microsoft.com/office/drawing/2014/main" id="{C4C49AA0-92A4-630B-405C-13E96996D338}"/>
+                <a16:creationId xmlns:a16="http://schemas.microsoft.com/office/drawing/2014/main" id="{72C2ADA5-5EC4-3F09-4EF6-9DD72F41C2EF}"/>
               </a:ext>
             </a:extLst>
           </p:cNvPr>
@@ -4182,7 +4204,7 @@
     </p:spTree>
     <p:extLst>
       <p:ext uri="{BB962C8B-B14F-4D97-AF65-F5344CB8AC3E}">
-        <p14:creationId xmlns:p14="http://schemas.microsoft.com/office/powerpoint/2010/main" val="1203183251"/>
+        <p14:creationId xmlns:p14="http://schemas.microsoft.com/office/powerpoint/2010/main" val="497046294"/>
       </p:ext>
     </p:extLst>
   </p:cSld>
@@ -4214,6 +4236,262 @@
           <p:cNvPr id="2" name="Title 1">
             <a:extLst>
               <a:ext uri="{FF2B5EF4-FFF2-40B4-BE49-F238E27FC236}">
+                <a16:creationId xmlns:a16="http://schemas.microsoft.com/office/drawing/2014/main" id="{DB90EDC9-44EF-BE03-BA59-2DF481CEA602}"/>
+              </a:ext>
+            </a:extLst>
+          </p:cNvPr>
+          <p:cNvSpPr>
+            <a:spLocks noGrp="1"/>
+          </p:cNvSpPr>
+          <p:nvPr>
+            <p:ph type="title"/>
+          </p:nvPr>
+        </p:nvSpPr>
+        <p:spPr/>
+        <p:txBody>
+          <a:bodyPr/>
+          <a:lstStyle/>
+          <a:p>
+            <a:r>
+              <a:rPr lang="en-GB" dirty="0" err="1"/>
+              <a:t>Winogradsky</a:t>
+            </a:r>
+            <a:r>
+              <a:rPr lang="en-GB" dirty="0"/>
+              <a:t> column data </a:t>
+            </a:r>
+            <a:r>
+              <a:rPr lang="en-GB" dirty="0">
+                <a:sym typeface="Wingdings" panose="05000000000000000000" pitchFamily="2" charset="2"/>
+              </a:rPr>
+              <a:t> R Studio demo</a:t>
+            </a:r>
+            <a:endParaRPr lang="en-GB" dirty="0"/>
+          </a:p>
+        </p:txBody>
+      </p:sp>
+      <p:sp>
+        <p:nvSpPr>
+          <p:cNvPr id="3" name="Content Placeholder 2">
+            <a:extLst>
+              <a:ext uri="{FF2B5EF4-FFF2-40B4-BE49-F238E27FC236}">
+                <a16:creationId xmlns:a16="http://schemas.microsoft.com/office/drawing/2014/main" id="{72C2ADA5-5EC4-3F09-4EF6-9DD72F41C2EF}"/>
+              </a:ext>
+            </a:extLst>
+          </p:cNvPr>
+          <p:cNvSpPr>
+            <a:spLocks noGrp="1"/>
+          </p:cNvSpPr>
+          <p:nvPr>
+            <p:ph idx="1"/>
+          </p:nvPr>
+        </p:nvSpPr>
+        <p:spPr/>
+        <p:txBody>
+          <a:bodyPr/>
+          <a:lstStyle/>
+          <a:p>
+            <a:r>
+              <a:rPr lang="en-GB" dirty="0"/>
+              <a:t>Which of the plots is "best"/most effective/most useful? </a:t>
+            </a:r>
+          </a:p>
+          <a:p>
+            <a:r>
+              <a:rPr lang="en-GB" dirty="0"/>
+              <a:t>How would you interpret these data? Which column do you think has the most cyanobacteria? </a:t>
+            </a:r>
+          </a:p>
+          <a:p>
+            <a:pPr lvl="1"/>
+            <a:r>
+              <a:rPr lang="en-GB" dirty="0"/>
+              <a:t>Are there any flaws in the experimental design? </a:t>
+            </a:r>
+          </a:p>
+          <a:p>
+            <a:r>
+              <a:rPr lang="en-GB" dirty="0"/>
+              <a:t>Can you think of other ways to visualise and/or present these data? </a:t>
+            </a:r>
+          </a:p>
+          <a:p>
+            <a:pPr lvl="1"/>
+            <a:r>
+              <a:rPr lang="en-GB" dirty="0"/>
+              <a:t>Does the audience you are presenting the data to matter?</a:t>
+            </a:r>
+          </a:p>
+          <a:p>
+            <a:pPr lvl="1"/>
+            <a:r>
+              <a:rPr lang="en-GB" dirty="0"/>
+              <a:t>How would you present these data for publication in a scientific journal?</a:t>
+            </a:r>
+          </a:p>
+        </p:txBody>
+      </p:sp>
+    </p:spTree>
+    <p:extLst>
+      <p:ext uri="{BB962C8B-B14F-4D97-AF65-F5344CB8AC3E}">
+        <p14:creationId xmlns:p14="http://schemas.microsoft.com/office/powerpoint/2010/main" val="2957678122"/>
+      </p:ext>
+    </p:extLst>
+  </p:cSld>
+  <p:clrMapOvr>
+    <a:masterClrMapping/>
+  </p:clrMapOvr>
+</p:sld>
+</file>
+
+<file path=ppt/slides/slide13.xml><?xml version="1.0" encoding="utf-8"?>
+<p:sld xmlns:a="http://schemas.openxmlformats.org/drawingml/2006/main" xmlns:r="http://schemas.openxmlformats.org/officeDocument/2006/relationships" xmlns:p="http://schemas.openxmlformats.org/presentationml/2006/main">
+  <p:cSld>
+    <p:spTree>
+      <p:nvGrpSpPr>
+        <p:cNvPr id="1" name=""/>
+        <p:cNvGrpSpPr/>
+        <p:nvPr/>
+      </p:nvGrpSpPr>
+      <p:grpSpPr>
+        <a:xfrm>
+          <a:off x="0" y="0"/>
+          <a:ext cx="0" cy="0"/>
+          <a:chOff x="0" y="0"/>
+          <a:chExt cx="0" cy="0"/>
+        </a:xfrm>
+      </p:grpSpPr>
+      <p:sp>
+        <p:nvSpPr>
+          <p:cNvPr id="2" name="Title 1">
+            <a:extLst>
+              <a:ext uri="{FF2B5EF4-FFF2-40B4-BE49-F238E27FC236}">
+                <a16:creationId xmlns:a16="http://schemas.microsoft.com/office/drawing/2014/main" id="{64D2A8D5-8A52-2C79-B36E-36655F6F18EB}"/>
+              </a:ext>
+            </a:extLst>
+          </p:cNvPr>
+          <p:cNvSpPr>
+            <a:spLocks noGrp="1"/>
+          </p:cNvSpPr>
+          <p:nvPr>
+            <p:ph type="title"/>
+          </p:nvPr>
+        </p:nvSpPr>
+        <p:spPr/>
+        <p:txBody>
+          <a:bodyPr/>
+          <a:lstStyle/>
+          <a:p>
+            <a:r>
+              <a:rPr lang="en-GB" dirty="0"/>
+              <a:t>Case study 2: </a:t>
+            </a:r>
+          </a:p>
+        </p:txBody>
+      </p:sp>
+      <p:sp>
+        <p:nvSpPr>
+          <p:cNvPr id="3" name="Content Placeholder 2">
+            <a:extLst>
+              <a:ext uri="{FF2B5EF4-FFF2-40B4-BE49-F238E27FC236}">
+                <a16:creationId xmlns:a16="http://schemas.microsoft.com/office/drawing/2014/main" id="{C4C49AA0-92A4-630B-405C-13E96996D338}"/>
+              </a:ext>
+            </a:extLst>
+          </p:cNvPr>
+          <p:cNvSpPr>
+            <a:spLocks noGrp="1"/>
+          </p:cNvSpPr>
+          <p:nvPr>
+            <p:ph idx="1"/>
+          </p:nvPr>
+        </p:nvSpPr>
+        <p:spPr/>
+        <p:txBody>
+          <a:bodyPr/>
+          <a:lstStyle/>
+          <a:p>
+            <a:r>
+              <a:rPr lang="en-GB" dirty="0"/>
+              <a:t>Atlas RM, </a:t>
+            </a:r>
+            <a:r>
+              <a:rPr lang="en-GB" dirty="0" err="1"/>
+              <a:t>Stoeckel</a:t>
+            </a:r>
+            <a:r>
+              <a:rPr lang="en-GB" dirty="0"/>
+              <a:t> DM, Faith SA, </a:t>
+            </a:r>
+            <a:r>
+              <a:rPr lang="en-GB" dirty="0" err="1"/>
+              <a:t>Minard</a:t>
+            </a:r>
+            <a:r>
+              <a:rPr lang="en-GB" dirty="0"/>
+              <a:t>-Smith A, Thorn JR, </a:t>
+            </a:r>
+            <a:r>
+              <a:rPr lang="en-GB" dirty="0" err="1"/>
+              <a:t>Benotti</a:t>
+            </a:r>
+            <a:r>
+              <a:rPr lang="en-GB" dirty="0"/>
+              <a:t> MJ. Oil Biodegradation and Oil-Degrading Microbial Populations in Marsh Sediments Impacted by Oil from the Deepwater Horizon Well Blowout. </a:t>
+            </a:r>
+            <a:r>
+              <a:rPr lang="en-GB" i="1" dirty="0"/>
+              <a:t>Environ </a:t>
+            </a:r>
+            <a:r>
+              <a:rPr lang="en-GB" i="1" dirty="0" err="1"/>
+              <a:t>Sci</a:t>
+            </a:r>
+            <a:r>
+              <a:rPr lang="en-GB" i="1" dirty="0"/>
+              <a:t> Technol</a:t>
+            </a:r>
+            <a:r>
+              <a:rPr lang="en-GB" dirty="0"/>
+              <a:t>. 2015;49(14):8356-8366. doi:10.1021/acs.est.5b00413</a:t>
+            </a:r>
+          </a:p>
+        </p:txBody>
+      </p:sp>
+    </p:spTree>
+    <p:extLst>
+      <p:ext uri="{BB962C8B-B14F-4D97-AF65-F5344CB8AC3E}">
+        <p14:creationId xmlns:p14="http://schemas.microsoft.com/office/powerpoint/2010/main" val="1203183251"/>
+      </p:ext>
+    </p:extLst>
+  </p:cSld>
+  <p:clrMapOvr>
+    <a:masterClrMapping/>
+  </p:clrMapOvr>
+</p:sld>
+</file>
+
+<file path=ppt/slides/slide14.xml><?xml version="1.0" encoding="utf-8"?>
+<p:sld xmlns:a="http://schemas.openxmlformats.org/drawingml/2006/main" xmlns:r="http://schemas.openxmlformats.org/officeDocument/2006/relationships" xmlns:p="http://schemas.openxmlformats.org/presentationml/2006/main">
+  <p:cSld>
+    <p:spTree>
+      <p:nvGrpSpPr>
+        <p:cNvPr id="1" name=""/>
+        <p:cNvGrpSpPr/>
+        <p:nvPr/>
+      </p:nvGrpSpPr>
+      <p:grpSpPr>
+        <a:xfrm>
+          <a:off x="0" y="0"/>
+          <a:ext cx="0" cy="0"/>
+          <a:chOff x="0" y="0"/>
+          <a:chExt cx="0" cy="0"/>
+        </a:xfrm>
+      </p:grpSpPr>
+      <p:sp>
+        <p:nvSpPr>
+          <p:cNvPr id="2" name="Title 1">
+            <a:extLst>
+              <a:ext uri="{FF2B5EF4-FFF2-40B4-BE49-F238E27FC236}">
                 <a16:creationId xmlns:a16="http://schemas.microsoft.com/office/drawing/2014/main" id="{64D2A8D5-8A52-2C79-B36E-36655F6F18EB}"/>
               </a:ext>
             </a:extLst>
@@ -4275,7 +4553,7 @@
 </p:sld>
 </file>
 
-<file path=ppt/slides/slide13.xml><?xml version="1.0" encoding="utf-8"?>
+<file path=ppt/slides/slide15.xml><?xml version="1.0" encoding="utf-8"?>
 <p:sld xmlns:a="http://schemas.openxmlformats.org/drawingml/2006/main" xmlns:r="http://schemas.openxmlformats.org/officeDocument/2006/relationships" xmlns:p="http://schemas.openxmlformats.org/presentationml/2006/main">
   <p:cSld>
     <p:spTree>
@@ -4883,7 +5161,7 @@
           <a:lstStyle/>
           <a:p>
             <a:r>
-              <a:rPr lang="en-US" dirty="0"/>
+              <a:rPr lang="en-US" b="1" dirty="0"/>
               <a:t>Life on this planet is mostly microbial</a:t>
             </a:r>
           </a:p>
@@ -5014,7 +5292,7 @@
         <p:spPr>
           <a:xfrm>
             <a:off x="273033" y="1581187"/>
-            <a:ext cx="6857254" cy="4620829"/>
+            <a:ext cx="6515393" cy="4620829"/>
           </a:xfrm>
           <a:prstGeom prst="rect">
             <a:avLst/>
@@ -5201,29 +5479,18 @@
                 <a:latin typeface="Arial" panose="020B0604020202020204" pitchFamily="34" charset="0"/>
                 <a:cs typeface="Arial" panose="020B0604020202020204" pitchFamily="34" charset="0"/>
               </a:rPr>
-              <a:t>Microbes are diverse, able to grow/thrive/reproduce in </a:t>
-            </a:r>
-            <a:r>
-              <a:rPr lang="en-GB" sz="2800">
-                <a:latin typeface="Arial" panose="020B0604020202020204" pitchFamily="34" charset="0"/>
-                <a:cs typeface="Arial" panose="020B0604020202020204" pitchFamily="34" charset="0"/>
-              </a:rPr>
-              <a:t>diverse environments</a:t>
-            </a:r>
-            <a:endParaRPr lang="en-GB" sz="2800" dirty="0">
-              <a:latin typeface="Arial" panose="020B0604020202020204" pitchFamily="34" charset="0"/>
-              <a:cs typeface="Arial" panose="020B0604020202020204" pitchFamily="34" charset="0"/>
-            </a:endParaRPr>
-          </a:p>
-          <a:p>
-            <a:pPr marL="800100" lvl="2" indent="-342900">
+              <a:t>Microbes are diverse, able to adapt to, and grow/thrive/reproduce in diverse environments</a:t>
+            </a:r>
+          </a:p>
+          <a:p>
+            <a:pPr marL="342900" lvl="1" indent="-342900">
               <a:spcBef>
                 <a:spcPts val="1000"/>
               </a:spcBef>
               <a:buFont typeface="Wingdings" panose="05000000000000000000" pitchFamily="2" charset="2"/>
               <a:buChar char="§"/>
             </a:pPr>
-            <a:endParaRPr lang="en-GB" sz="2400" dirty="0">
+            <a:endParaRPr lang="en-GB" sz="2800" dirty="0">
               <a:latin typeface="Arial" panose="020B0604020202020204" pitchFamily="34" charset="0"/>
               <a:cs typeface="Arial" panose="020B0604020202020204" pitchFamily="34" charset="0"/>
             </a:endParaRPr>
@@ -5294,7 +5561,7 @@
           <a:lstStyle/>
           <a:p>
             <a:r>
-              <a:rPr lang="en-GB" dirty="0"/>
+              <a:rPr lang="en-GB" b="1" dirty="0"/>
               <a:t>Microbial Ecology</a:t>
             </a:r>
           </a:p>
@@ -5322,17 +5589,107 @@
           <a:lstStyle/>
           <a:p>
             <a:r>
-              <a:rPr lang="en-GB" dirty="0"/>
-              <a:t>Background </a:t>
-            </a:r>
-            <a:r>
-              <a:rPr lang="en-GB" dirty="0" err="1"/>
-              <a:t>blahblahblah</a:t>
-            </a:r>
+              <a:rPr lang="en-GB" dirty="0" smtClean="0"/>
+              <a:t>Measuring microbial diversity: </a:t>
+            </a:r>
+          </a:p>
+          <a:p>
+            <a:pPr lvl="1"/>
+            <a:r>
+              <a:rPr lang="en-GB" dirty="0" smtClean="0"/>
+              <a:t>How many species are present? </a:t>
+            </a:r>
+            <a:r>
+              <a:rPr lang="en-GB" dirty="0" smtClean="0">
+                <a:sym typeface="Wingdings" panose="05000000000000000000" pitchFamily="2" charset="2"/>
+              </a:rPr>
+              <a:t> </a:t>
+            </a:r>
+            <a:r>
+              <a:rPr lang="en-GB" b="1" dirty="0" smtClean="0">
+                <a:sym typeface="Wingdings" panose="05000000000000000000" pitchFamily="2" charset="2"/>
+              </a:rPr>
+              <a:t>species richness</a:t>
+            </a:r>
+          </a:p>
+          <a:p>
+            <a:pPr lvl="1"/>
+            <a:r>
+              <a:rPr lang="en-GB" dirty="0" smtClean="0">
+                <a:sym typeface="Wingdings" panose="05000000000000000000" pitchFamily="2" charset="2"/>
+              </a:rPr>
+              <a:t>How abundant are they?  </a:t>
+            </a:r>
+            <a:r>
+              <a:rPr lang="en-GB" b="1" dirty="0" smtClean="0">
+                <a:sym typeface="Wingdings" panose="05000000000000000000" pitchFamily="2" charset="2"/>
+              </a:rPr>
+              <a:t>species evenness</a:t>
+            </a:r>
+            <a:endParaRPr lang="en-GB" dirty="0" smtClean="0">
+              <a:sym typeface="Wingdings" panose="05000000000000000000" pitchFamily="2" charset="2"/>
+            </a:endParaRPr>
+          </a:p>
+          <a:p>
+            <a:pPr lvl="1"/>
             <a:endParaRPr lang="en-GB" dirty="0"/>
           </a:p>
         </p:txBody>
       </p:sp>
+      <p:pic>
+        <p:nvPicPr>
+          <p:cNvPr id="4" name="Picture 3"/>
+          <p:cNvPicPr>
+            <a:picLocks noChangeAspect="1"/>
+          </p:cNvPicPr>
+          <p:nvPr/>
+        </p:nvPicPr>
+        <p:blipFill>
+          <a:blip r:embed="rId2">
+            <a:extLst>
+              <a:ext uri="{28A0092B-C50C-407E-A947-70E740481C1C}">
+                <a14:useLocalDpi xmlns:a14="http://schemas.microsoft.com/office/drawing/2010/main" val="0"/>
+              </a:ext>
+            </a:extLst>
+          </a:blip>
+          <a:srcRect/>
+          <a:stretch>
+            <a:fillRect/>
+          </a:stretch>
+        </p:blipFill>
+        <p:spPr bwMode="auto">
+          <a:xfrm>
+            <a:off x="8134080" y="3739893"/>
+            <a:ext cx="3900603" cy="2995203"/>
+          </a:xfrm>
+          <a:prstGeom prst="rect">
+            <a:avLst/>
+          </a:prstGeom>
+          <a:noFill/>
+          <a:ln>
+            <a:noFill/>
+          </a:ln>
+          <a:extLst>
+            <a:ext uri="{909E8E84-426E-40DD-AFC4-6F175D3DCCD1}">
+              <a14:hiddenFill xmlns:a14="http://schemas.microsoft.com/office/drawing/2010/main">
+                <a:solidFill>
+                  <a:srgbClr val="FFFFFF"/>
+                </a:solidFill>
+              </a14:hiddenFill>
+            </a:ext>
+            <a:ext uri="{91240B29-F687-4F45-9708-019B960494DF}">
+              <a14:hiddenLine xmlns:a14="http://schemas.microsoft.com/office/drawing/2010/main" w="9525">
+                <a:solidFill>
+                  <a:srgbClr val="000000"/>
+                </a:solidFill>
+                <a:miter lim="800000"/>
+                <a:headEnd/>
+                <a:tailEnd/>
+              </a14:hiddenLine>
+            </a:ext>
+          </a:extLst>
+        </p:spPr>
+      </p:pic>
     </p:spTree>
     <p:extLst>
       <p:ext uri="{BB962C8B-B14F-4D97-AF65-F5344CB8AC3E}">
@@ -5365,6 +5722,374 @@
       </p:grpSpPr>
       <p:sp>
         <p:nvSpPr>
+          <p:cNvPr id="2" name="Title 1"/>
+          <p:cNvSpPr>
+            <a:spLocks noGrp="1"/>
+          </p:cNvSpPr>
+          <p:nvPr>
+            <p:ph type="title"/>
+          </p:nvPr>
+        </p:nvSpPr>
+        <p:spPr/>
+        <p:txBody>
+          <a:bodyPr/>
+          <a:lstStyle/>
+          <a:p>
+            <a:r>
+              <a:rPr lang="en-GB" dirty="0" smtClean="0"/>
+              <a:t>Today’s workshop structure</a:t>
+            </a:r>
+            <a:endParaRPr lang="en-GB" dirty="0"/>
+          </a:p>
+        </p:txBody>
+      </p:sp>
+      <p:sp>
+        <p:nvSpPr>
+          <p:cNvPr id="3" name="Content Placeholder 2"/>
+          <p:cNvSpPr>
+            <a:spLocks noGrp="1"/>
+          </p:cNvSpPr>
+          <p:nvPr>
+            <p:ph idx="1"/>
+          </p:nvPr>
+        </p:nvSpPr>
+        <p:spPr>
+          <a:xfrm>
+            <a:off x="838200" y="1825625"/>
+            <a:ext cx="10515600" cy="1773918"/>
+          </a:xfrm>
+        </p:spPr>
+        <p:txBody>
+          <a:bodyPr/>
+          <a:lstStyle/>
+          <a:p>
+            <a:r>
+              <a:rPr lang="en-GB" dirty="0" smtClean="0"/>
+              <a:t>3 case studies that illustrate key principles in microbial ecology and diversity</a:t>
+            </a:r>
+          </a:p>
+          <a:p>
+            <a:pPr lvl="1"/>
+            <a:r>
+              <a:rPr lang="en-GB" dirty="0" smtClean="0"/>
+              <a:t>Practice with data analysis working with R studio and ggplot2 </a:t>
+            </a:r>
+            <a:endParaRPr lang="en-GB" dirty="0"/>
+          </a:p>
+        </p:txBody>
+      </p:sp>
+      <p:pic>
+        <p:nvPicPr>
+          <p:cNvPr id="4" name="Picture 3"/>
+          <p:cNvPicPr>
+            <a:picLocks noChangeAspect="1"/>
+          </p:cNvPicPr>
+          <p:nvPr/>
+        </p:nvPicPr>
+        <p:blipFill rotWithShape="1">
+          <a:blip r:embed="rId2" cstate="print">
+            <a:extLst>
+              <a:ext uri="{28A0092B-C50C-407E-A947-70E740481C1C}">
+                <a14:useLocalDpi xmlns:a14="http://schemas.microsoft.com/office/drawing/2010/main" val="0"/>
+              </a:ext>
+            </a:extLst>
+          </a:blip>
+          <a:srcRect l="60465" t="17553" b="11855"/>
+          <a:stretch/>
+        </p:blipFill>
+        <p:spPr>
+          <a:xfrm>
+            <a:off x="335340" y="3433521"/>
+            <a:ext cx="2659507" cy="2661844"/>
+          </a:xfrm>
+          <a:prstGeom prst="rect">
+            <a:avLst/>
+          </a:prstGeom>
+        </p:spPr>
+      </p:pic>
+      <p:sp>
+        <p:nvSpPr>
+          <p:cNvPr id="5" name="Title 1"/>
+          <p:cNvSpPr txBox="1">
+            <a:spLocks/>
+          </p:cNvSpPr>
+          <p:nvPr/>
+        </p:nvSpPr>
+        <p:spPr>
+          <a:xfrm>
+            <a:off x="155557" y="5704115"/>
+            <a:ext cx="3995530" cy="1386114"/>
+          </a:xfrm>
+          <a:prstGeom prst="rect">
+            <a:avLst/>
+          </a:prstGeom>
+        </p:spPr>
+        <p:txBody>
+          <a:bodyPr vert="horz" lIns="91440" tIns="45720" rIns="91440" bIns="45720" rtlCol="0" anchor="ctr">
+            <a:normAutofit/>
+          </a:bodyPr>
+          <a:lstStyle>
+            <a:lvl1pPr algn="l" defTabSz="914400" rtl="0" eaLnBrk="1" latinLnBrk="0" hangingPunct="1">
+              <a:lnSpc>
+                <a:spcPct val="90000"/>
+              </a:lnSpc>
+              <a:spcBef>
+                <a:spcPct val="0"/>
+              </a:spcBef>
+              <a:buNone/>
+              <a:defRPr sz="4400" kern="1200">
+                <a:solidFill>
+                  <a:schemeClr val="tx1"/>
+                </a:solidFill>
+                <a:latin typeface="+mj-lt"/>
+                <a:ea typeface="+mj-ea"/>
+                <a:cs typeface="+mj-cs"/>
+              </a:defRPr>
+            </a:lvl1pPr>
+          </a:lstStyle>
+          <a:p>
+            <a:r>
+              <a:rPr lang="en-GB" sz="2400" b="1" dirty="0" smtClean="0">
+                <a:latin typeface="Arial" panose="020B0604020202020204" pitchFamily="34" charset="0"/>
+                <a:cs typeface="Arial" panose="020B0604020202020204" pitchFamily="34" charset="0"/>
+              </a:rPr>
+              <a:t>1</a:t>
+            </a:r>
+            <a:r>
+              <a:rPr lang="en-GB" sz="2400" b="1" dirty="0">
+                <a:latin typeface="Arial" panose="020B0604020202020204" pitchFamily="34" charset="0"/>
+                <a:cs typeface="Arial" panose="020B0604020202020204" pitchFamily="34" charset="0"/>
+              </a:rPr>
+              <a:t>: </a:t>
+            </a:r>
+            <a:r>
+              <a:rPr lang="en-GB" sz="2400" b="1" dirty="0" err="1">
+                <a:latin typeface="Arial" panose="020B0604020202020204" pitchFamily="34" charset="0"/>
+                <a:cs typeface="Arial" panose="020B0604020202020204" pitchFamily="34" charset="0"/>
+              </a:rPr>
+              <a:t>Winogradsky</a:t>
+            </a:r>
+            <a:r>
+              <a:rPr lang="en-GB" sz="2400" b="1" dirty="0">
+                <a:latin typeface="Arial" panose="020B0604020202020204" pitchFamily="34" charset="0"/>
+                <a:cs typeface="Arial" panose="020B0604020202020204" pitchFamily="34" charset="0"/>
+              </a:rPr>
+              <a:t> columns</a:t>
+            </a:r>
+          </a:p>
+        </p:txBody>
+      </p:sp>
+      <p:pic>
+        <p:nvPicPr>
+          <p:cNvPr id="7" name="Picture 6"/>
+          <p:cNvPicPr>
+            <a:picLocks noChangeAspect="1"/>
+          </p:cNvPicPr>
+          <p:nvPr/>
+        </p:nvPicPr>
+        <p:blipFill>
+          <a:blip r:embed="rId3" cstate="print">
+            <a:extLst>
+              <a:ext uri="{28A0092B-C50C-407E-A947-70E740481C1C}">
+                <a14:useLocalDpi xmlns:a14="http://schemas.microsoft.com/office/drawing/2010/main" val="0"/>
+              </a:ext>
+            </a:extLst>
+          </a:blip>
+          <a:stretch>
+            <a:fillRect/>
+          </a:stretch>
+        </p:blipFill>
+        <p:spPr>
+          <a:xfrm>
+            <a:off x="4027479" y="3433521"/>
+            <a:ext cx="3478104" cy="2689157"/>
+          </a:xfrm>
+          <a:prstGeom prst="rect">
+            <a:avLst/>
+          </a:prstGeom>
+        </p:spPr>
+      </p:pic>
+      <p:sp>
+        <p:nvSpPr>
+          <p:cNvPr id="8" name="Title 1"/>
+          <p:cNvSpPr txBox="1">
+            <a:spLocks/>
+          </p:cNvSpPr>
+          <p:nvPr/>
+        </p:nvSpPr>
+        <p:spPr>
+          <a:xfrm>
+            <a:off x="4342317" y="5737793"/>
+            <a:ext cx="3995530" cy="1386114"/>
+          </a:xfrm>
+          <a:prstGeom prst="rect">
+            <a:avLst/>
+          </a:prstGeom>
+        </p:spPr>
+        <p:txBody>
+          <a:bodyPr vert="horz" lIns="91440" tIns="45720" rIns="91440" bIns="45720" rtlCol="0" anchor="ctr">
+            <a:normAutofit/>
+          </a:bodyPr>
+          <a:lstStyle>
+            <a:lvl1pPr algn="l" defTabSz="914400" rtl="0" eaLnBrk="1" latinLnBrk="0" hangingPunct="1">
+              <a:lnSpc>
+                <a:spcPct val="90000"/>
+              </a:lnSpc>
+              <a:spcBef>
+                <a:spcPct val="0"/>
+              </a:spcBef>
+              <a:buNone/>
+              <a:defRPr sz="4400" kern="1200">
+                <a:solidFill>
+                  <a:schemeClr val="tx1"/>
+                </a:solidFill>
+                <a:latin typeface="+mj-lt"/>
+                <a:ea typeface="+mj-ea"/>
+                <a:cs typeface="+mj-cs"/>
+              </a:defRPr>
+            </a:lvl1pPr>
+          </a:lstStyle>
+          <a:p>
+            <a:r>
+              <a:rPr lang="en-GB" sz="2400" b="1" dirty="0" smtClean="0">
+                <a:latin typeface="Arial" panose="020B0604020202020204" pitchFamily="34" charset="0"/>
+                <a:cs typeface="Arial" panose="020B0604020202020204" pitchFamily="34" charset="0"/>
+              </a:rPr>
+              <a:t>2: Oil spill clean-up</a:t>
+            </a:r>
+            <a:endParaRPr lang="en-GB" sz="2400" b="1" dirty="0">
+              <a:latin typeface="Arial" panose="020B0604020202020204" pitchFamily="34" charset="0"/>
+              <a:cs typeface="Arial" panose="020B0604020202020204" pitchFamily="34" charset="0"/>
+            </a:endParaRPr>
+          </a:p>
+        </p:txBody>
+      </p:sp>
+      <p:sp>
+        <p:nvSpPr>
+          <p:cNvPr id="9" name="Title 1"/>
+          <p:cNvSpPr txBox="1">
+            <a:spLocks/>
+          </p:cNvSpPr>
+          <p:nvPr/>
+        </p:nvSpPr>
+        <p:spPr>
+          <a:xfrm>
+            <a:off x="8543708" y="5737793"/>
+            <a:ext cx="3995530" cy="1386114"/>
+          </a:xfrm>
+          <a:prstGeom prst="rect">
+            <a:avLst/>
+          </a:prstGeom>
+        </p:spPr>
+        <p:txBody>
+          <a:bodyPr vert="horz" lIns="91440" tIns="45720" rIns="91440" bIns="45720" rtlCol="0" anchor="ctr">
+            <a:normAutofit/>
+          </a:bodyPr>
+          <a:lstStyle>
+            <a:lvl1pPr algn="l" defTabSz="914400" rtl="0" eaLnBrk="1" latinLnBrk="0" hangingPunct="1">
+              <a:lnSpc>
+                <a:spcPct val="90000"/>
+              </a:lnSpc>
+              <a:spcBef>
+                <a:spcPct val="0"/>
+              </a:spcBef>
+              <a:buNone/>
+              <a:defRPr sz="4400" kern="1200">
+                <a:solidFill>
+                  <a:schemeClr val="tx1"/>
+                </a:solidFill>
+                <a:latin typeface="+mj-lt"/>
+                <a:ea typeface="+mj-ea"/>
+                <a:cs typeface="+mj-cs"/>
+              </a:defRPr>
+            </a:lvl1pPr>
+          </a:lstStyle>
+          <a:p>
+            <a:r>
+              <a:rPr lang="en-GB" sz="2400" b="1" dirty="0" smtClean="0">
+                <a:latin typeface="Arial" panose="020B0604020202020204" pitchFamily="34" charset="0"/>
+                <a:cs typeface="Arial" panose="020B0604020202020204" pitchFamily="34" charset="0"/>
+              </a:rPr>
+              <a:t>3: Bee microbiome</a:t>
+            </a:r>
+            <a:endParaRPr lang="en-GB" sz="2400" b="1" dirty="0">
+              <a:latin typeface="Arial" panose="020B0604020202020204" pitchFamily="34" charset="0"/>
+              <a:cs typeface="Arial" panose="020B0604020202020204" pitchFamily="34" charset="0"/>
+            </a:endParaRPr>
+          </a:p>
+        </p:txBody>
+      </p:sp>
+      <p:pic>
+        <p:nvPicPr>
+          <p:cNvPr id="1026" name="Picture 2" descr="Bumblebee | Facts about Bumblebees - The RSPB"/>
+          <p:cNvPicPr>
+            <a:picLocks noChangeAspect="1" noChangeArrowheads="1"/>
+          </p:cNvPicPr>
+          <p:nvPr/>
+        </p:nvPicPr>
+        <p:blipFill rotWithShape="1">
+          <a:blip r:embed="rId4">
+            <a:extLst>
+              <a:ext uri="{28A0092B-C50C-407E-A947-70E740481C1C}">
+                <a14:useLocalDpi xmlns:a14="http://schemas.microsoft.com/office/drawing/2010/main" val="0"/>
+              </a:ext>
+            </a:extLst>
+          </a:blip>
+          <a:srcRect l="24670" t="15492" r="24916" b="16783"/>
+          <a:stretch/>
+        </p:blipFill>
+        <p:spPr bwMode="auto">
+          <a:xfrm>
+            <a:off x="8337847" y="3433522"/>
+            <a:ext cx="3648157" cy="2756794"/>
+          </a:xfrm>
+          <a:prstGeom prst="rect">
+            <a:avLst/>
+          </a:prstGeom>
+          <a:noFill/>
+          <a:extLst>
+            <a:ext uri="{909E8E84-426E-40DD-AFC4-6F175D3DCCD1}">
+              <a14:hiddenFill xmlns:a14="http://schemas.microsoft.com/office/drawing/2010/main">
+                <a:solidFill>
+                  <a:srgbClr val="FFFFFF"/>
+                </a:solidFill>
+              </a14:hiddenFill>
+            </a:ext>
+          </a:extLst>
+        </p:spPr>
+      </p:pic>
+    </p:spTree>
+    <p:extLst>
+      <p:ext uri="{BB962C8B-B14F-4D97-AF65-F5344CB8AC3E}">
+        <p14:creationId xmlns:p14="http://schemas.microsoft.com/office/powerpoint/2010/main" val="3017779505"/>
+      </p:ext>
+    </p:extLst>
+  </p:cSld>
+  <p:clrMapOvr>
+    <a:masterClrMapping/>
+  </p:clrMapOvr>
+</p:sld>
+</file>
+
+<file path=ppt/slides/slide7.xml><?xml version="1.0" encoding="utf-8"?>
+<p:sld xmlns:a="http://schemas.openxmlformats.org/drawingml/2006/main" xmlns:r="http://schemas.openxmlformats.org/officeDocument/2006/relationships" xmlns:p="http://schemas.openxmlformats.org/presentationml/2006/main">
+  <p:cSld>
+    <p:spTree>
+      <p:nvGrpSpPr>
+        <p:cNvPr id="1" name=""/>
+        <p:cNvGrpSpPr/>
+        <p:nvPr/>
+      </p:nvGrpSpPr>
+      <p:grpSpPr>
+        <a:xfrm>
+          <a:off x="0" y="0"/>
+          <a:ext cx="0" cy="0"/>
+          <a:chOff x="0" y="0"/>
+          <a:chExt cx="0" cy="0"/>
+        </a:xfrm>
+      </p:grpSpPr>
+      <p:sp>
+        <p:nvSpPr>
           <p:cNvPr id="2" name="Title 1">
             <a:extLst>
               <a:ext uri="{FF2B5EF4-FFF2-40B4-BE49-F238E27FC236}">
@@ -5385,9 +6110,10 @@
           <a:lstStyle/>
           <a:p>
             <a:r>
-              <a:rPr lang="en-GB" dirty="0"/>
-              <a:t>A few notes about R Studio</a:t>
-            </a:r>
+              <a:rPr lang="en-GB" b="1" dirty="0" smtClean="0"/>
+              <a:t>Why are we using R Studio?</a:t>
+            </a:r>
+            <a:endParaRPr lang="en-GB" b="1" dirty="0"/>
           </a:p>
         </p:txBody>
       </p:sp>
@@ -5412,7 +6138,52 @@
           <a:bodyPr/>
           <a:lstStyle/>
           <a:p>
-            <a:endParaRPr lang="en-GB"/>
+            <a:r>
+              <a:rPr lang="en-GB" dirty="0" smtClean="0"/>
+              <a:t>Reproducible analyses</a:t>
+            </a:r>
+          </a:p>
+          <a:p>
+            <a:r>
+              <a:rPr lang="en-GB" dirty="0" smtClean="0"/>
+              <a:t>Complex data analysis, modelling, and visualisation capabilities</a:t>
+            </a:r>
+          </a:p>
+          <a:p>
+            <a:r>
+              <a:rPr lang="en-GB" dirty="0" smtClean="0"/>
+              <a:t>Wide range of packages available for </a:t>
+            </a:r>
+            <a:r>
+              <a:rPr lang="en-GB" dirty="0" err="1" smtClean="0"/>
+              <a:t>differenta</a:t>
+            </a:r>
+            <a:r>
+              <a:rPr lang="en-GB" dirty="0" smtClean="0"/>
+              <a:t> </a:t>
+            </a:r>
+            <a:r>
+              <a:rPr lang="en-GB" dirty="0" err="1" smtClean="0"/>
+              <a:t>nalyses</a:t>
+            </a:r>
+            <a:endParaRPr lang="en-GB" dirty="0" smtClean="0"/>
+          </a:p>
+          <a:p>
+            <a:r>
+              <a:rPr lang="en-GB" dirty="0" smtClean="0"/>
+              <a:t>Open source, collaborative, freely available</a:t>
+            </a:r>
+          </a:p>
+          <a:p>
+            <a:r>
+              <a:rPr lang="en-GB" dirty="0" smtClean="0"/>
+              <a:t>Excellent t</a:t>
+            </a:r>
+            <a:r>
+              <a:rPr lang="en-GB" dirty="0" smtClean="0"/>
+              <a:t>ransferrable skills (honours thesis project, other courses, masters/PhDs, jobs…)</a:t>
+            </a:r>
+            <a:endParaRPr lang="en-GB" dirty="0"/>
           </a:p>
         </p:txBody>
       </p:sp>
@@ -5429,7 +6200,172 @@
 </p:sld>
 </file>
 
-<file path=ppt/slides/slide7.xml><?xml version="1.0" encoding="utf-8"?>
+<file path=ppt/slides/slide8.xml><?xml version="1.0" encoding="utf-8"?>
+<p:sld xmlns:a="http://schemas.openxmlformats.org/drawingml/2006/main" xmlns:r="http://schemas.openxmlformats.org/officeDocument/2006/relationships" xmlns:p="http://schemas.openxmlformats.org/presentationml/2006/main">
+  <p:cSld>
+    <p:spTree>
+      <p:nvGrpSpPr>
+        <p:cNvPr id="1" name=""/>
+        <p:cNvGrpSpPr/>
+        <p:nvPr/>
+      </p:nvGrpSpPr>
+      <p:grpSpPr>
+        <a:xfrm>
+          <a:off x="0" y="0"/>
+          <a:ext cx="0" cy="0"/>
+          <a:chOff x="0" y="0"/>
+          <a:chExt cx="0" cy="0"/>
+        </a:xfrm>
+      </p:grpSpPr>
+      <p:sp>
+        <p:nvSpPr>
+          <p:cNvPr id="2" name="Title 1"/>
+          <p:cNvSpPr>
+            <a:spLocks noGrp="1"/>
+          </p:cNvSpPr>
+          <p:nvPr>
+            <p:ph type="title"/>
+          </p:nvPr>
+        </p:nvSpPr>
+        <p:spPr>
+          <a:xfrm>
+            <a:off x="391886" y="365125"/>
+            <a:ext cx="11800114" cy="1325563"/>
+          </a:xfrm>
+        </p:spPr>
+        <p:txBody>
+          <a:bodyPr>
+            <a:normAutofit/>
+          </a:bodyPr>
+          <a:lstStyle/>
+          <a:p>
+            <a:r>
+              <a:rPr lang="en-GB" b="1" dirty="0" smtClean="0"/>
+              <a:t>Some notes on data management best practices – start forming good habits today</a:t>
+            </a:r>
+            <a:endParaRPr lang="en-GB" b="1" dirty="0"/>
+          </a:p>
+        </p:txBody>
+      </p:sp>
+      <p:sp>
+        <p:nvSpPr>
+          <p:cNvPr id="3" name="Content Placeholder 2"/>
+          <p:cNvSpPr>
+            <a:spLocks noGrp="1"/>
+          </p:cNvSpPr>
+          <p:nvPr>
+            <p:ph idx="1"/>
+          </p:nvPr>
+        </p:nvSpPr>
+        <p:spPr/>
+        <p:txBody>
+          <a:bodyPr>
+            <a:normAutofit fontScale="92500" lnSpcReduction="20000"/>
+          </a:bodyPr>
+          <a:lstStyle/>
+          <a:p>
+            <a:r>
+              <a:rPr lang="en-GB" dirty="0"/>
+              <a:t>There is no one correct way to organise a project or data, </a:t>
+            </a:r>
+            <a:r>
+              <a:rPr lang="en-GB" b="1" dirty="0"/>
+              <a:t>but there are good principles for project and data management</a:t>
+            </a:r>
+            <a:endParaRPr lang="en-GB" dirty="0"/>
+          </a:p>
+          <a:p>
+            <a:r>
+              <a:rPr lang="en-GB" dirty="0"/>
+              <a:t>Use a single working directory per project or analysis (and name it after the project or analysis</a:t>
+            </a:r>
+            <a:r>
+              <a:rPr lang="en-GB" dirty="0" smtClean="0"/>
+              <a:t>)</a:t>
+            </a:r>
+          </a:p>
+          <a:p>
+            <a:pPr lvl="1"/>
+            <a:r>
+              <a:rPr lang="en-GB" dirty="0" smtClean="0"/>
+              <a:t>Use clear, self-describing, readable file names </a:t>
+            </a:r>
+          </a:p>
+          <a:p>
+            <a:pPr lvl="1"/>
+            <a:r>
+              <a:rPr lang="en-GB" dirty="0" smtClean="0"/>
+              <a:t>Back up your files/data</a:t>
+            </a:r>
+            <a:endParaRPr lang="en-GB" dirty="0"/>
+          </a:p>
+          <a:p>
+            <a:r>
+              <a:rPr lang="en-GB" dirty="0"/>
+              <a:t>Treat raw data as </a:t>
+            </a:r>
+            <a:r>
+              <a:rPr lang="en-GB" b="1" dirty="0"/>
+              <a:t>read-only</a:t>
+            </a:r>
+            <a:endParaRPr lang="en-GB" dirty="0"/>
+          </a:p>
+          <a:p>
+            <a:pPr lvl="1"/>
+            <a:r>
+              <a:rPr lang="en-GB" dirty="0"/>
+              <a:t>Place cleaned data in a separate file/folder</a:t>
+            </a:r>
+          </a:p>
+          <a:p>
+            <a:pPr lvl="1"/>
+            <a:r>
+              <a:rPr lang="en-GB" dirty="0"/>
+              <a:t>Place output/analysed data in a separate file/folder</a:t>
+            </a:r>
+          </a:p>
+          <a:p>
+            <a:r>
+              <a:rPr lang="en-GB" dirty="0"/>
+              <a:t>Clean your data in an automated, reproducible </a:t>
+            </a:r>
+            <a:r>
+              <a:rPr lang="en-GB" dirty="0" smtClean="0"/>
+              <a:t>way.</a:t>
+            </a:r>
+            <a:endParaRPr lang="en-GB" dirty="0"/>
+          </a:p>
+          <a:p>
+            <a:r>
+              <a:rPr lang="en-GB" dirty="0"/>
+              <a:t>Store all data and analysis in a human-readable format</a:t>
+            </a:r>
+          </a:p>
+          <a:p>
+            <a:r>
+              <a:rPr lang="en-GB" dirty="0"/>
+              <a:t>Automate your analysis as much as possible</a:t>
+            </a:r>
+          </a:p>
+          <a:p>
+            <a:endParaRPr lang="en-GB" dirty="0"/>
+          </a:p>
+        </p:txBody>
+      </p:sp>
+    </p:spTree>
+    <p:extLst>
+      <p:ext uri="{BB962C8B-B14F-4D97-AF65-F5344CB8AC3E}">
+        <p14:creationId xmlns:p14="http://schemas.microsoft.com/office/powerpoint/2010/main" val="2546334386"/>
+      </p:ext>
+    </p:extLst>
+  </p:cSld>
+  <p:clrMapOvr>
+    <a:masterClrMapping/>
+  </p:clrMapOvr>
+</p:sld>
+</file>
+
+<file path=ppt/slides/slide9.xml><?xml version="1.0" encoding="utf-8"?>
 <p:sld xmlns:a="http://schemas.openxmlformats.org/drawingml/2006/main" xmlns:r="http://schemas.openxmlformats.org/officeDocument/2006/relationships" xmlns:p="http://schemas.openxmlformats.org/presentationml/2006/main">
   <p:cSld>
     <p:spTree>
@@ -5813,187 +6749,6 @@
     <p:extLst>
       <p:ext uri="{BB962C8B-B14F-4D97-AF65-F5344CB8AC3E}">
         <p14:creationId xmlns:p14="http://schemas.microsoft.com/office/powerpoint/2010/main" val="1258231549"/>
-      </p:ext>
-    </p:extLst>
-  </p:cSld>
-  <p:clrMapOvr>
-    <a:masterClrMapping/>
-  </p:clrMapOvr>
-</p:sld>
-</file>
-
-<file path=ppt/slides/slide8.xml><?xml version="1.0" encoding="utf-8"?>
-<p:sld xmlns:a="http://schemas.openxmlformats.org/drawingml/2006/main" xmlns:r="http://schemas.openxmlformats.org/officeDocument/2006/relationships" xmlns:p="http://schemas.openxmlformats.org/presentationml/2006/main">
-  <p:cSld>
-    <p:spTree>
-      <p:nvGrpSpPr>
-        <p:cNvPr id="1" name=""/>
-        <p:cNvGrpSpPr/>
-        <p:nvPr/>
-      </p:nvGrpSpPr>
-      <p:grpSpPr>
-        <a:xfrm>
-          <a:off x="0" y="0"/>
-          <a:ext cx="0" cy="0"/>
-          <a:chOff x="0" y="0"/>
-          <a:chExt cx="0" cy="0"/>
-        </a:xfrm>
-      </p:grpSpPr>
-      <p:sp>
-        <p:nvSpPr>
-          <p:cNvPr id="2" name="Title 1">
-            <a:extLst>
-              <a:ext uri="{FF2B5EF4-FFF2-40B4-BE49-F238E27FC236}">
-                <a16:creationId xmlns:a16="http://schemas.microsoft.com/office/drawing/2014/main" id="{DB90EDC9-44EF-BE03-BA59-2DF481CEA602}"/>
-              </a:ext>
-            </a:extLst>
-          </p:cNvPr>
-          <p:cNvSpPr>
-            <a:spLocks noGrp="1"/>
-          </p:cNvSpPr>
-          <p:nvPr>
-            <p:ph type="title"/>
-          </p:nvPr>
-        </p:nvSpPr>
-        <p:spPr/>
-        <p:txBody>
-          <a:bodyPr/>
-          <a:lstStyle/>
-          <a:p>
-            <a:r>
-              <a:rPr lang="en-GB" dirty="0" err="1"/>
-              <a:t>Winogradsky</a:t>
-            </a:r>
-            <a:r>
-              <a:rPr lang="en-GB" dirty="0"/>
-              <a:t> column experimental design details</a:t>
-            </a:r>
-          </a:p>
-        </p:txBody>
-      </p:sp>
-      <p:sp>
-        <p:nvSpPr>
-          <p:cNvPr id="3" name="Content Placeholder 2">
-            <a:extLst>
-              <a:ext uri="{FF2B5EF4-FFF2-40B4-BE49-F238E27FC236}">
-                <a16:creationId xmlns:a16="http://schemas.microsoft.com/office/drawing/2014/main" id="{72C2ADA5-5EC4-3F09-4EF6-9DD72F41C2EF}"/>
-              </a:ext>
-            </a:extLst>
-          </p:cNvPr>
-          <p:cNvSpPr>
-            <a:spLocks noGrp="1"/>
-          </p:cNvSpPr>
-          <p:nvPr>
-            <p:ph idx="1"/>
-          </p:nvPr>
-        </p:nvSpPr>
-        <p:spPr/>
-        <p:txBody>
-          <a:bodyPr/>
-          <a:lstStyle/>
-          <a:p>
-            <a:endParaRPr lang="en-GB"/>
-          </a:p>
-        </p:txBody>
-      </p:sp>
-    </p:spTree>
-    <p:extLst>
-      <p:ext uri="{BB962C8B-B14F-4D97-AF65-F5344CB8AC3E}">
-        <p14:creationId xmlns:p14="http://schemas.microsoft.com/office/powerpoint/2010/main" val="782600913"/>
-      </p:ext>
-    </p:extLst>
-  </p:cSld>
-  <p:clrMapOvr>
-    <a:masterClrMapping/>
-  </p:clrMapOvr>
-</p:sld>
-</file>
-
-<file path=ppt/slides/slide9.xml><?xml version="1.0" encoding="utf-8"?>
-<p:sld xmlns:a="http://schemas.openxmlformats.org/drawingml/2006/main" xmlns:r="http://schemas.openxmlformats.org/officeDocument/2006/relationships" xmlns:p="http://schemas.openxmlformats.org/presentationml/2006/main">
-  <p:cSld>
-    <p:spTree>
-      <p:nvGrpSpPr>
-        <p:cNvPr id="1" name=""/>
-        <p:cNvGrpSpPr/>
-        <p:nvPr/>
-      </p:nvGrpSpPr>
-      <p:grpSpPr>
-        <a:xfrm>
-          <a:off x="0" y="0"/>
-          <a:ext cx="0" cy="0"/>
-          <a:chOff x="0" y="0"/>
-          <a:chExt cx="0" cy="0"/>
-        </a:xfrm>
-      </p:grpSpPr>
-      <p:sp>
-        <p:nvSpPr>
-          <p:cNvPr id="2" name="Title 1">
-            <a:extLst>
-              <a:ext uri="{FF2B5EF4-FFF2-40B4-BE49-F238E27FC236}">
-                <a16:creationId xmlns:a16="http://schemas.microsoft.com/office/drawing/2014/main" id="{DB90EDC9-44EF-BE03-BA59-2DF481CEA602}"/>
-              </a:ext>
-            </a:extLst>
-          </p:cNvPr>
-          <p:cNvSpPr>
-            <a:spLocks noGrp="1"/>
-          </p:cNvSpPr>
-          <p:nvPr>
-            <p:ph type="title"/>
-          </p:nvPr>
-        </p:nvSpPr>
-        <p:spPr/>
-        <p:txBody>
-          <a:bodyPr/>
-          <a:lstStyle/>
-          <a:p>
-            <a:r>
-              <a:rPr lang="en-GB" dirty="0" err="1"/>
-              <a:t>Winogradsky</a:t>
-            </a:r>
-            <a:r>
-              <a:rPr lang="en-GB" dirty="0"/>
-              <a:t> column data </a:t>
-            </a:r>
-            <a:r>
-              <a:rPr lang="en-GB" dirty="0">
-                <a:sym typeface="Wingdings" panose="05000000000000000000" pitchFamily="2" charset="2"/>
-              </a:rPr>
-              <a:t> R Studio demo</a:t>
-            </a:r>
-            <a:endParaRPr lang="en-GB" dirty="0"/>
-          </a:p>
-        </p:txBody>
-      </p:sp>
-      <p:sp>
-        <p:nvSpPr>
-          <p:cNvPr id="3" name="Content Placeholder 2">
-            <a:extLst>
-              <a:ext uri="{FF2B5EF4-FFF2-40B4-BE49-F238E27FC236}">
-                <a16:creationId xmlns:a16="http://schemas.microsoft.com/office/drawing/2014/main" id="{72C2ADA5-5EC4-3F09-4EF6-9DD72F41C2EF}"/>
-              </a:ext>
-            </a:extLst>
-          </p:cNvPr>
-          <p:cNvSpPr>
-            <a:spLocks noGrp="1"/>
-          </p:cNvSpPr>
-          <p:nvPr>
-            <p:ph idx="1"/>
-          </p:nvPr>
-        </p:nvSpPr>
-        <p:spPr/>
-        <p:txBody>
-          <a:bodyPr/>
-          <a:lstStyle/>
-          <a:p>
-            <a:endParaRPr lang="en-GB"/>
-          </a:p>
-        </p:txBody>
-      </p:sp>
-    </p:spTree>
-    <p:extLst>
-      <p:ext uri="{BB962C8B-B14F-4D97-AF65-F5344CB8AC3E}">
-        <p14:creationId xmlns:p14="http://schemas.microsoft.com/office/powerpoint/2010/main" val="497046294"/>
       </p:ext>
     </p:extLst>
   </p:cSld>

</xml_diff>